<commit_message>
Added Images folder to saving location in python scripts. Updated vis7 to change bar outline colors for readability and powerpoint to include new colors. Created readme.txt
</commit_message>
<xml_diff>
--- a/Data Visualization Challenge 2020 JLR.pptx
+++ b/Data Visualization Challenge 2020 JLR.pptx
@@ -215,7 +215,7 @@
           <a:p>
             <a:fld id="{A15B09F3-0E80-426D-A408-37B302D00528}" type="datetimeFigureOut">
               <a:rPr lang="en-US" smtClean="0"/>
-              <a:t>11/30/2020</a:t>
+              <a:t>12/2/2020</a:t>
             </a:fld>
             <a:endParaRPr lang="en-US"/>
           </a:p>
@@ -526,22 +526,7 @@
           <a:bodyPr/>
           <a:lstStyle/>
           <a:p>
-            <a:r>
-              <a:rPr lang="en-US" dirty="0"/>
-              <a:t>Label black line</a:t>
-            </a:r>
-          </a:p>
-          <a:p>
-            <a:r>
-              <a:rPr lang="en-US" dirty="0"/>
-              <a:t>Make black line lighter/transparent?</a:t>
-            </a:r>
-          </a:p>
-          <a:p>
-            <a:r>
-              <a:rPr lang="en-US" dirty="0"/>
-              <a:t>Percentage (volume)</a:t>
-            </a:r>
+            <a:endParaRPr lang="en-US" dirty="0"/>
           </a:p>
         </p:txBody>
       </p:sp>
@@ -625,22 +610,7 @@
           <a:bodyPr/>
           <a:lstStyle/>
           <a:p>
-            <a:r>
-              <a:rPr lang="en-US" dirty="0"/>
-              <a:t>Label black line</a:t>
-            </a:r>
-          </a:p>
-          <a:p>
-            <a:r>
-              <a:rPr lang="en-US" dirty="0"/>
-              <a:t>Make black line lighter/transparent?</a:t>
-            </a:r>
-          </a:p>
-          <a:p>
-            <a:r>
-              <a:rPr lang="en-US" dirty="0"/>
-              <a:t>Percentage (volume)</a:t>
-            </a:r>
+            <a:endParaRPr lang="en-US" dirty="0"/>
           </a:p>
         </p:txBody>
       </p:sp>
@@ -5646,42 +5616,6 @@
           <a:chExt cx="0" cy="0"/>
         </a:xfrm>
       </p:grpSpPr>
-      <p:pic>
-        <p:nvPicPr>
-          <p:cNvPr id="12" name="Picture 11">
-            <a:extLst>
-              <a:ext uri="{FF2B5EF4-FFF2-40B4-BE49-F238E27FC236}">
-                <a16:creationId xmlns:a16="http://schemas.microsoft.com/office/drawing/2014/main" id="{8498F4B8-10C9-437B-B34A-316EE1D00738}"/>
-              </a:ext>
-            </a:extLst>
-          </p:cNvPr>
-          <p:cNvPicPr>
-            <a:picLocks noChangeAspect="1"/>
-          </p:cNvPicPr>
-          <p:nvPr/>
-        </p:nvPicPr>
-        <p:blipFill>
-          <a:blip r:embed="rId2">
-            <a:extLst>
-              <a:ext uri="{28A0092B-C50C-407E-A947-70E740481C1C}">
-                <a14:useLocalDpi xmlns:a14="http://schemas.microsoft.com/office/drawing/2010/main" val="0"/>
-              </a:ext>
-            </a:extLst>
-          </a:blip>
-          <a:stretch>
-            <a:fillRect/>
-          </a:stretch>
-        </p:blipFill>
-        <p:spPr>
-          <a:xfrm>
-            <a:off x="0" y="1822139"/>
-            <a:ext cx="8770776" cy="3886832"/>
-          </a:xfrm>
-          <a:prstGeom prst="rect">
-            <a:avLst/>
-          </a:prstGeom>
-        </p:spPr>
-      </p:pic>
       <p:sp>
         <p:nvSpPr>
           <p:cNvPr id="6" name="Title 5">
@@ -5806,6 +5740,42 @@
           </a:p>
         </p:txBody>
       </p:sp>
+      <p:pic>
+        <p:nvPicPr>
+          <p:cNvPr id="3" name="Picture 2">
+            <a:extLst>
+              <a:ext uri="{FF2B5EF4-FFF2-40B4-BE49-F238E27FC236}">
+                <a16:creationId xmlns:a16="http://schemas.microsoft.com/office/drawing/2014/main" id="{E7877964-1A76-4A7B-8F70-3F0211840A8E}"/>
+              </a:ext>
+            </a:extLst>
+          </p:cNvPr>
+          <p:cNvPicPr>
+            <a:picLocks noChangeAspect="1"/>
+          </p:cNvPicPr>
+          <p:nvPr/>
+        </p:nvPicPr>
+        <p:blipFill>
+          <a:blip r:embed="rId2">
+            <a:extLst>
+              <a:ext uri="{28A0092B-C50C-407E-A947-70E740481C1C}">
+                <a14:useLocalDpi xmlns:a14="http://schemas.microsoft.com/office/drawing/2010/main" val="0"/>
+              </a:ext>
+            </a:extLst>
+          </a:blip>
+          <a:stretch>
+            <a:fillRect/>
+          </a:stretch>
+        </p:blipFill>
+        <p:spPr>
+          <a:xfrm>
+            <a:off x="0" y="1713973"/>
+            <a:ext cx="8873412" cy="3932316"/>
+          </a:xfrm>
+          <a:prstGeom prst="rect">
+            <a:avLst/>
+          </a:prstGeom>
+        </p:spPr>
+      </p:pic>
     </p:spTree>
     <p:extLst>
       <p:ext uri="{BB962C8B-B14F-4D97-AF65-F5344CB8AC3E}">
@@ -5838,10 +5808,10 @@
       </p:grpSpPr>
       <p:pic>
         <p:nvPicPr>
-          <p:cNvPr id="12" name="Picture 11">
-            <a:extLst>
-              <a:ext uri="{FF2B5EF4-FFF2-40B4-BE49-F238E27FC236}">
-                <a16:creationId xmlns:a16="http://schemas.microsoft.com/office/drawing/2014/main" id="{8498F4B8-10C9-437B-B34A-316EE1D00738}"/>
+          <p:cNvPr id="7" name="Picture 6">
+            <a:extLst>
+              <a:ext uri="{FF2B5EF4-FFF2-40B4-BE49-F238E27FC236}">
+                <a16:creationId xmlns:a16="http://schemas.microsoft.com/office/drawing/2014/main" id="{3BD9C083-A588-4343-8FFA-B141B1553D05}"/>
               </a:ext>
             </a:extLst>
           </p:cNvPr>
@@ -5864,8 +5834,8 @@
         </p:blipFill>
         <p:spPr>
           <a:xfrm>
-            <a:off x="0" y="1822139"/>
-            <a:ext cx="8770776" cy="3886832"/>
+            <a:off x="0" y="1713973"/>
+            <a:ext cx="8873412" cy="3932316"/>
           </a:xfrm>
           <a:prstGeom prst="rect">
             <a:avLst/>

</xml_diff>

<commit_message>
Updates to wording in ppt
</commit_message>
<xml_diff>
--- a/Data Visualization Challenge 2020 JLR.pptx
+++ b/Data Visualization Challenge 2020 JLR.pptx
@@ -5973,7 +5973,15 @@
             </a:pPr>
             <a:r>
               <a:rPr lang="en-US" dirty="0"/>
-              <a:t>Example shows daily, could resample (e.g., hour of day, monthly, total over any period)</a:t>
+              <a:t>Could show on any timescale presented in </a:t>
+            </a:r>
+            <a:r>
+              <a:rPr lang="en-US"/>
+              <a:t>this work </a:t>
+            </a:r>
+            <a:r>
+              <a:rPr lang="en-US" dirty="0"/>
+              <a:t>(e.g., hour of day, monthly, total over any period)</a:t>
             </a:r>
           </a:p>
           <a:p>
@@ -5983,7 +5991,7 @@
             </a:pPr>
             <a:r>
               <a:rPr lang="en-US" dirty="0"/>
-              <a:t>Could show building of interest against any value – any percentile, min, and/or max nearby could be shown to help determine where they stand</a:t>
+              <a:t>Could show building of interest against any percentile (including min or max) of nearby buildings</a:t>
             </a:r>
           </a:p>
           <a:p>

</xml_diff>

<commit_message>
Added histogram scripts and plots, updated powerpoint to include them
</commit_message>
<xml_diff>
--- a/Data Visualization Challenge 2020 JLR.pptx
+++ b/Data Visualization Challenge 2020 JLR.pptx
@@ -5,7 +5,7 @@
     <p:sldMasterId id="2147483648" r:id="rId1"/>
   </p:sldMasterIdLst>
   <p:notesMasterIdLst>
-    <p:notesMasterId r:id="rId18"/>
+    <p:notesMasterId r:id="rId19"/>
   </p:notesMasterIdLst>
   <p:sldIdLst>
     <p:sldId id="256" r:id="rId2"/>
@@ -24,6 +24,7 @@
     <p:sldId id="269" r:id="rId15"/>
     <p:sldId id="271" r:id="rId16"/>
     <p:sldId id="272" r:id="rId17"/>
+    <p:sldId id="273" r:id="rId18"/>
   </p:sldIdLst>
   <p:sldSz cx="12192000" cy="6858000"/>
   <p:notesSz cx="6858000" cy="9144000"/>
@@ -215,7 +216,7 @@
           <a:p>
             <a:fld id="{A15B09F3-0E80-426D-A408-37B302D00528}" type="datetimeFigureOut">
               <a:rPr lang="en-US" smtClean="0"/>
-              <a:t>12/2/2020</a:t>
+              <a:t>12/4/2020</a:t>
             </a:fld>
             <a:endParaRPr lang="en-US"/>
           </a:p>
@@ -6010,6 +6011,239 @@
     <p:extLst>
       <p:ext uri="{BB962C8B-B14F-4D97-AF65-F5344CB8AC3E}">
         <p14:creationId xmlns:p14="http://schemas.microsoft.com/office/powerpoint/2010/main" val="801740617"/>
+      </p:ext>
+    </p:extLst>
+  </p:cSld>
+  <p:clrMapOvr>
+    <a:masterClrMapping/>
+  </p:clrMapOvr>
+</p:sld>
+</file>
+
+<file path=ppt/slides/slide17.xml><?xml version="1.0" encoding="utf-8"?>
+<p:sld xmlns:a="http://schemas.openxmlformats.org/drawingml/2006/main" xmlns:r="http://schemas.openxmlformats.org/officeDocument/2006/relationships" xmlns:p="http://schemas.openxmlformats.org/presentationml/2006/main">
+  <p:cSld>
+    <p:spTree>
+      <p:nvGrpSpPr>
+        <p:cNvPr id="1" name=""/>
+        <p:cNvGrpSpPr/>
+        <p:nvPr/>
+      </p:nvGrpSpPr>
+      <p:grpSpPr>
+        <a:xfrm>
+          <a:off x="0" y="0"/>
+          <a:ext cx="0" cy="0"/>
+          <a:chOff x="0" y="0"/>
+          <a:chExt cx="0" cy="0"/>
+        </a:xfrm>
+      </p:grpSpPr>
+      <p:sp>
+        <p:nvSpPr>
+          <p:cNvPr id="2" name="Title 1">
+            <a:extLst>
+              <a:ext uri="{FF2B5EF4-FFF2-40B4-BE49-F238E27FC236}">
+                <a16:creationId xmlns:a16="http://schemas.microsoft.com/office/drawing/2014/main" id="{8E1AF0C4-9089-47D0-8188-2DFE5D363151}"/>
+              </a:ext>
+            </a:extLst>
+          </p:cNvPr>
+          <p:cNvSpPr>
+            <a:spLocks noGrp="1"/>
+          </p:cNvSpPr>
+          <p:nvPr>
+            <p:ph type="title"/>
+          </p:nvPr>
+        </p:nvSpPr>
+        <p:spPr/>
+        <p:txBody>
+          <a:bodyPr/>
+          <a:lstStyle/>
+          <a:p>
+            <a:r>
+              <a:rPr lang="en-US" dirty="0"/>
+              <a:t>Histogram Comparisons to Nearby Homes</a:t>
+            </a:r>
+          </a:p>
+        </p:txBody>
+      </p:sp>
+      <p:sp>
+        <p:nvSpPr>
+          <p:cNvPr id="10" name="Content Placeholder 9">
+            <a:extLst>
+              <a:ext uri="{FF2B5EF4-FFF2-40B4-BE49-F238E27FC236}">
+                <a16:creationId xmlns:a16="http://schemas.microsoft.com/office/drawing/2014/main" id="{16358659-C174-422D-A02A-F82CAF860D7F}"/>
+              </a:ext>
+            </a:extLst>
+          </p:cNvPr>
+          <p:cNvSpPr>
+            <a:spLocks noGrp="1"/>
+          </p:cNvSpPr>
+          <p:nvPr>
+            <p:ph sz="half" idx="1"/>
+          </p:nvPr>
+        </p:nvSpPr>
+        <p:spPr>
+          <a:xfrm>
+            <a:off x="587829" y="1825625"/>
+            <a:ext cx="7716415" cy="4351338"/>
+          </a:xfrm>
+        </p:spPr>
+        <p:txBody>
+          <a:bodyPr>
+            <a:normAutofit fontScale="85000" lnSpcReduction="20000"/>
+          </a:bodyPr>
+          <a:lstStyle/>
+          <a:p>
+            <a:r>
+              <a:rPr lang="en-US" dirty="0"/>
+              <a:t>Histograms of daily values of volume of water used in home of interest and nearby homes for each type and total</a:t>
+            </a:r>
+          </a:p>
+          <a:p>
+            <a:pPr lvl="1"/>
+            <a:r>
+              <a:rPr lang="en-US" dirty="0"/>
+              <a:t>Total here shown without irrigation since it causes bimodal distribution</a:t>
+            </a:r>
+          </a:p>
+          <a:p>
+            <a:r>
+              <a:rPr lang="en-US" dirty="0"/>
+              <a:t>Would be improved with more days to get more full distribution (15 days in record)</a:t>
+            </a:r>
+          </a:p>
+          <a:p>
+            <a:r>
+              <a:rPr lang="en-US" dirty="0"/>
+              <a:t>Another method of comparison to indicate days of higher water use than surrounding homes</a:t>
+            </a:r>
+          </a:p>
+          <a:p>
+            <a:pPr lvl="1"/>
+            <a:r>
+              <a:rPr lang="en-US" dirty="0"/>
+              <a:t>Individual plots for each type could indicate problem use areas (e.g., if shower histogram has many bars higher than surrounding areas, but all others don’t)</a:t>
+            </a:r>
+          </a:p>
+          <a:p>
+            <a:pPr lvl="1"/>
+            <a:r>
+              <a:rPr lang="en-US" dirty="0"/>
+              <a:t>Could show if one volume range has many more than others and cause homeowner to consider why</a:t>
+            </a:r>
+          </a:p>
+          <a:p>
+            <a:r>
+              <a:rPr lang="en-US" dirty="0"/>
+              <a:t>Histogram may be advanced concept for average homeowner</a:t>
+            </a:r>
+          </a:p>
+        </p:txBody>
+      </p:sp>
+      <p:sp>
+        <p:nvSpPr>
+          <p:cNvPr id="3" name="Slide Number Placeholder 2">
+            <a:extLst>
+              <a:ext uri="{FF2B5EF4-FFF2-40B4-BE49-F238E27FC236}">
+                <a16:creationId xmlns:a16="http://schemas.microsoft.com/office/drawing/2014/main" id="{82BB1B51-CF1A-4B69-8530-4411EB64A654}"/>
+              </a:ext>
+            </a:extLst>
+          </p:cNvPr>
+          <p:cNvSpPr>
+            <a:spLocks noGrp="1"/>
+          </p:cNvSpPr>
+          <p:nvPr>
+            <p:ph type="sldNum" sz="quarter" idx="12"/>
+          </p:nvPr>
+        </p:nvSpPr>
+        <p:spPr/>
+        <p:txBody>
+          <a:bodyPr/>
+          <a:lstStyle/>
+          <a:p>
+            <a:fld id="{3F8E978B-2864-4D28-B1B3-2F4738476E14}" type="slidenum">
+              <a:rPr lang="en-US" smtClean="0"/>
+              <a:t>17</a:t>
+            </a:fld>
+            <a:endParaRPr lang="en-US"/>
+          </a:p>
+        </p:txBody>
+      </p:sp>
+      <p:pic>
+        <p:nvPicPr>
+          <p:cNvPr id="7" name="Picture 6">
+            <a:extLst>
+              <a:ext uri="{FF2B5EF4-FFF2-40B4-BE49-F238E27FC236}">
+                <a16:creationId xmlns:a16="http://schemas.microsoft.com/office/drawing/2014/main" id="{0961C1FB-8E8A-45D9-BDE9-554944FF590C}"/>
+              </a:ext>
+            </a:extLst>
+          </p:cNvPr>
+          <p:cNvPicPr>
+            <a:picLocks noChangeAspect="1"/>
+          </p:cNvPicPr>
+          <p:nvPr/>
+        </p:nvPicPr>
+        <p:blipFill>
+          <a:blip r:embed="rId2">
+            <a:extLst>
+              <a:ext uri="{28A0092B-C50C-407E-A947-70E740481C1C}">
+                <a14:useLocalDpi xmlns:a14="http://schemas.microsoft.com/office/drawing/2010/main" val="0"/>
+              </a:ext>
+            </a:extLst>
+          </a:blip>
+          <a:stretch>
+            <a:fillRect/>
+          </a:stretch>
+        </p:blipFill>
+        <p:spPr>
+          <a:xfrm>
+            <a:off x="8304244" y="4062585"/>
+            <a:ext cx="3706747" cy="2780060"/>
+          </a:xfrm>
+          <a:prstGeom prst="rect">
+            <a:avLst/>
+          </a:prstGeom>
+        </p:spPr>
+      </p:pic>
+      <p:pic>
+        <p:nvPicPr>
+          <p:cNvPr id="9" name="Picture 8">
+            <a:extLst>
+              <a:ext uri="{FF2B5EF4-FFF2-40B4-BE49-F238E27FC236}">
+                <a16:creationId xmlns:a16="http://schemas.microsoft.com/office/drawing/2014/main" id="{F5F6BB12-CD17-4087-92A3-BE01BE6B63EC}"/>
+              </a:ext>
+            </a:extLst>
+          </p:cNvPr>
+          <p:cNvPicPr>
+            <a:picLocks noChangeAspect="1"/>
+          </p:cNvPicPr>
+          <p:nvPr/>
+        </p:nvPicPr>
+        <p:blipFill>
+          <a:blip r:embed="rId3">
+            <a:extLst>
+              <a:ext uri="{28A0092B-C50C-407E-A947-70E740481C1C}">
+                <a14:useLocalDpi xmlns:a14="http://schemas.microsoft.com/office/drawing/2010/main" val="0"/>
+              </a:ext>
+            </a:extLst>
+          </a:blip>
+          <a:stretch>
+            <a:fillRect/>
+          </a:stretch>
+        </p:blipFill>
+        <p:spPr>
+          <a:xfrm>
+            <a:off x="8283088" y="1282524"/>
+            <a:ext cx="3706748" cy="2780061"/>
+          </a:xfrm>
+          <a:prstGeom prst="rect">
+            <a:avLst/>
+          </a:prstGeom>
+        </p:spPr>
+      </p:pic>
+    </p:spTree>
+    <p:extLst>
+      <p:ext uri="{BB962C8B-B14F-4D97-AF65-F5344CB8AC3E}">
+        <p14:creationId xmlns:p14="http://schemas.microsoft.com/office/powerpoint/2010/main" val="3676130459"/>
       </p:ext>
     </p:extLst>
   </p:cSld>

</xml_diff>

<commit_message>
Added comments to code. Also, fixed error in histogram script as well as resulting images and presentation
</commit_message>
<xml_diff>
--- a/Data Visualization Challenge 2020 JLR.pptx
+++ b/Data Visualization Challenge 2020 JLR.pptx
@@ -216,7 +216,7 @@
           <a:p>
             <a:fld id="{A15B09F3-0E80-426D-A408-37B302D00528}" type="datetimeFigureOut">
               <a:rPr lang="en-US" smtClean="0"/>
-              <a:t>12/4/2020</a:t>
+              <a:t>12/7/2020</a:t>
             </a:fld>
             <a:endParaRPr lang="en-US"/>
           </a:p>
@@ -6095,7 +6095,7 @@
           <a:p>
             <a:r>
               <a:rPr lang="en-US" dirty="0"/>
-              <a:t>Histograms of daily values of volume of water used in home of interest and nearby homes for each type and total</a:t>
+              <a:t>Histograms of 12-hour totals of volume of water used in home of interest and nearby homes for each type and total</a:t>
             </a:r>
           </a:p>
           <a:p>
@@ -6108,7 +6108,7 @@
           <a:p>
             <a:r>
               <a:rPr lang="en-US" dirty="0"/>
-              <a:t>Would be improved with more days to get more full distribution (15 days in record)</a:t>
+              <a:t>Would be improved with more days to get more full distribution (15 days in record, n = 29)</a:t>
             </a:r>
           </a:p>
           <a:p>
@@ -6170,10 +6170,10 @@
       </p:sp>
       <p:pic>
         <p:nvPicPr>
-          <p:cNvPr id="7" name="Picture 6">
-            <a:extLst>
-              <a:ext uri="{FF2B5EF4-FFF2-40B4-BE49-F238E27FC236}">
-                <a16:creationId xmlns:a16="http://schemas.microsoft.com/office/drawing/2014/main" id="{0961C1FB-8E8A-45D9-BDE9-554944FF590C}"/>
+          <p:cNvPr id="12" name="Picture 11">
+            <a:extLst>
+              <a:ext uri="{FF2B5EF4-FFF2-40B4-BE49-F238E27FC236}">
+                <a16:creationId xmlns:a16="http://schemas.microsoft.com/office/drawing/2014/main" id="{FEB2B919-4208-4DDB-A578-4991CC393620}"/>
               </a:ext>
             </a:extLst>
           </p:cNvPr>
@@ -6183,21 +6183,15 @@
           <p:nvPr/>
         </p:nvPicPr>
         <p:blipFill>
-          <a:blip r:embed="rId2">
-            <a:extLst>
-              <a:ext uri="{28A0092B-C50C-407E-A947-70E740481C1C}">
-                <a14:useLocalDpi xmlns:a14="http://schemas.microsoft.com/office/drawing/2010/main" val="0"/>
-              </a:ext>
-            </a:extLst>
-          </a:blip>
+          <a:blip r:embed="rId2"/>
           <a:stretch>
             <a:fillRect/>
           </a:stretch>
         </p:blipFill>
         <p:spPr>
           <a:xfrm>
-            <a:off x="8304244" y="4062585"/>
-            <a:ext cx="3706747" cy="2780060"/>
+            <a:off x="8750262" y="3988346"/>
+            <a:ext cx="3441738" cy="2868115"/>
           </a:xfrm>
           <a:prstGeom prst="rect">
             <a:avLst/>
@@ -6206,10 +6200,10 @@
       </p:pic>
       <p:pic>
         <p:nvPicPr>
-          <p:cNvPr id="9" name="Picture 8">
-            <a:extLst>
-              <a:ext uri="{FF2B5EF4-FFF2-40B4-BE49-F238E27FC236}">
-                <a16:creationId xmlns:a16="http://schemas.microsoft.com/office/drawing/2014/main" id="{F5F6BB12-CD17-4087-92A3-BE01BE6B63EC}"/>
+          <p:cNvPr id="14" name="Picture 13">
+            <a:extLst>
+              <a:ext uri="{FF2B5EF4-FFF2-40B4-BE49-F238E27FC236}">
+                <a16:creationId xmlns:a16="http://schemas.microsoft.com/office/drawing/2014/main" id="{E791BFF1-3EB3-48C9-ABF6-EA2CF75C7503}"/>
               </a:ext>
             </a:extLst>
           </p:cNvPr>
@@ -6219,21 +6213,15 @@
           <p:nvPr/>
         </p:nvPicPr>
         <p:blipFill>
-          <a:blip r:embed="rId3">
-            <a:extLst>
-              <a:ext uri="{28A0092B-C50C-407E-A947-70E740481C1C}">
-                <a14:useLocalDpi xmlns:a14="http://schemas.microsoft.com/office/drawing/2010/main" val="0"/>
-              </a:ext>
-            </a:extLst>
-          </a:blip>
+          <a:blip r:embed="rId3"/>
           <a:stretch>
             <a:fillRect/>
           </a:stretch>
         </p:blipFill>
         <p:spPr>
           <a:xfrm>
-            <a:off x="8283088" y="1282524"/>
-            <a:ext cx="3706748" cy="2780061"/>
+            <a:off x="8826759" y="1204321"/>
+            <a:ext cx="3365241" cy="2784025"/>
           </a:xfrm>
           <a:prstGeom prst="rect">
             <a:avLst/>

</xml_diff>

<commit_message>
Added Future Projections plot and updated ppt
</commit_message>
<xml_diff>
--- a/Data Visualization Challenge 2020 JLR.pptx
+++ b/Data Visualization Challenge 2020 JLR.pptx
@@ -5,7 +5,7 @@
     <p:sldMasterId id="2147483648" r:id="rId1"/>
   </p:sldMasterIdLst>
   <p:notesMasterIdLst>
-    <p:notesMasterId r:id="rId19"/>
+    <p:notesMasterId r:id="rId20"/>
   </p:notesMasterIdLst>
   <p:sldIdLst>
     <p:sldId id="256" r:id="rId2"/>
@@ -25,6 +25,7 @@
     <p:sldId id="271" r:id="rId16"/>
     <p:sldId id="272" r:id="rId17"/>
     <p:sldId id="273" r:id="rId18"/>
+    <p:sldId id="274" r:id="rId19"/>
   </p:sldIdLst>
   <p:sldSz cx="12192000" cy="6858000"/>
   <p:notesSz cx="6858000" cy="9144000"/>
@@ -216,7 +217,7 @@
           <a:p>
             <a:fld id="{A15B09F3-0E80-426D-A408-37B302D00528}" type="datetimeFigureOut">
               <a:rPr lang="en-US" smtClean="0"/>
-              <a:t>12/7/2020</a:t>
+              <a:t>12/10/2020</a:t>
             </a:fld>
             <a:endParaRPr lang="en-US"/>
           </a:p>
@@ -6241,6 +6242,191 @@
 </p:sld>
 </file>
 
+<file path=ppt/slides/slide18.xml><?xml version="1.0" encoding="utf-8"?>
+<p:sld xmlns:a="http://schemas.openxmlformats.org/drawingml/2006/main" xmlns:r="http://schemas.openxmlformats.org/officeDocument/2006/relationships" xmlns:p="http://schemas.openxmlformats.org/presentationml/2006/main">
+  <p:cSld>
+    <p:spTree>
+      <p:nvGrpSpPr>
+        <p:cNvPr id="1" name=""/>
+        <p:cNvGrpSpPr/>
+        <p:nvPr/>
+      </p:nvGrpSpPr>
+      <p:grpSpPr>
+        <a:xfrm>
+          <a:off x="0" y="0"/>
+          <a:ext cx="0" cy="0"/>
+          <a:chOff x="0" y="0"/>
+          <a:chExt cx="0" cy="0"/>
+        </a:xfrm>
+      </p:grpSpPr>
+      <p:sp>
+        <p:nvSpPr>
+          <p:cNvPr id="6" name="Title 5">
+            <a:extLst>
+              <a:ext uri="{FF2B5EF4-FFF2-40B4-BE49-F238E27FC236}">
+                <a16:creationId xmlns:a16="http://schemas.microsoft.com/office/drawing/2014/main" id="{7FFC8913-4D30-462E-BA42-0EC664091B8F}"/>
+              </a:ext>
+            </a:extLst>
+          </p:cNvPr>
+          <p:cNvSpPr>
+            <a:spLocks noGrp="1"/>
+          </p:cNvSpPr>
+          <p:nvPr>
+            <p:ph type="title"/>
+          </p:nvPr>
+        </p:nvSpPr>
+        <p:spPr/>
+        <p:txBody>
+          <a:bodyPr/>
+          <a:lstStyle/>
+          <a:p>
+            <a:r>
+              <a:rPr lang="en-US" dirty="0"/>
+              <a:t>Trend Projections</a:t>
+            </a:r>
+          </a:p>
+        </p:txBody>
+      </p:sp>
+      <p:sp>
+        <p:nvSpPr>
+          <p:cNvPr id="7" name="Content Placeholder 6">
+            <a:extLst>
+              <a:ext uri="{FF2B5EF4-FFF2-40B4-BE49-F238E27FC236}">
+                <a16:creationId xmlns:a16="http://schemas.microsoft.com/office/drawing/2014/main" id="{458862D5-960C-4EF9-830B-E3A7D2C8DD08}"/>
+              </a:ext>
+            </a:extLst>
+          </p:cNvPr>
+          <p:cNvSpPr>
+            <a:spLocks noGrp="1"/>
+          </p:cNvSpPr>
+          <p:nvPr>
+            <p:ph sz="half" idx="1"/>
+          </p:nvPr>
+        </p:nvSpPr>
+        <p:spPr>
+          <a:xfrm>
+            <a:off x="363894" y="1825625"/>
+            <a:ext cx="4049486" cy="4351338"/>
+          </a:xfrm>
+        </p:spPr>
+        <p:txBody>
+          <a:bodyPr>
+            <a:normAutofit fontScale="92500" lnSpcReduction="10000"/>
+          </a:bodyPr>
+          <a:lstStyle/>
+          <a:p>
+            <a:r>
+              <a:rPr lang="en-US" dirty="0"/>
+              <a:t>Projecting water use to a longer time scale (e.g., projecting first week of month to monthly scale)</a:t>
+            </a:r>
+          </a:p>
+          <a:p>
+            <a:pPr lvl="1"/>
+            <a:r>
+              <a:rPr lang="en-US" dirty="0"/>
+              <a:t>Compare longer time scale </a:t>
+            </a:r>
+          </a:p>
+          <a:p>
+            <a:pPr lvl="2"/>
+            <a:r>
+              <a:rPr lang="en-US" dirty="0"/>
+              <a:t>To previous minimum, maximum, median of building of interest</a:t>
+            </a:r>
+          </a:p>
+          <a:p>
+            <a:pPr lvl="2"/>
+            <a:r>
+              <a:rPr lang="en-US" dirty="0"/>
+              <a:t>To other nearby buildings’ minimum, maximum, median, average, etc.</a:t>
+            </a:r>
+          </a:p>
+          <a:p>
+            <a:pPr lvl="1"/>
+            <a:r>
+              <a:rPr lang="en-US" dirty="0"/>
+              <a:t>Alerts homeowners to use trends to keep end use down in future</a:t>
+            </a:r>
+          </a:p>
+        </p:txBody>
+      </p:sp>
+      <p:pic>
+        <p:nvPicPr>
+          <p:cNvPr id="10" name="Content Placeholder 9">
+            <a:extLst>
+              <a:ext uri="{FF2B5EF4-FFF2-40B4-BE49-F238E27FC236}">
+                <a16:creationId xmlns:a16="http://schemas.microsoft.com/office/drawing/2014/main" id="{FCFEBE61-A29E-4AC6-A05A-91004F2ACDA4}"/>
+              </a:ext>
+            </a:extLst>
+          </p:cNvPr>
+          <p:cNvPicPr>
+            <a:picLocks noGrp="1" noChangeAspect="1"/>
+          </p:cNvPicPr>
+          <p:nvPr>
+            <p:ph sz="half" idx="2"/>
+          </p:nvPr>
+        </p:nvPicPr>
+        <p:blipFill>
+          <a:blip r:embed="rId2">
+            <a:extLst>
+              <a:ext uri="{28A0092B-C50C-407E-A947-70E740481C1C}">
+                <a14:useLocalDpi xmlns:a14="http://schemas.microsoft.com/office/drawing/2010/main" val="0"/>
+              </a:ext>
+            </a:extLst>
+          </a:blip>
+          <a:stretch>
+            <a:fillRect/>
+          </a:stretch>
+        </p:blipFill>
+        <p:spPr>
+          <a:xfrm>
+            <a:off x="4488445" y="2030898"/>
+            <a:ext cx="7512375" cy="3992590"/>
+          </a:xfrm>
+        </p:spPr>
+      </p:pic>
+      <p:sp>
+        <p:nvSpPr>
+          <p:cNvPr id="5" name="Slide Number Placeholder 4">
+            <a:extLst>
+              <a:ext uri="{FF2B5EF4-FFF2-40B4-BE49-F238E27FC236}">
+                <a16:creationId xmlns:a16="http://schemas.microsoft.com/office/drawing/2014/main" id="{15D7EA10-9D80-4081-99ED-0847AA044784}"/>
+              </a:ext>
+            </a:extLst>
+          </p:cNvPr>
+          <p:cNvSpPr>
+            <a:spLocks noGrp="1"/>
+          </p:cNvSpPr>
+          <p:nvPr>
+            <p:ph type="sldNum" sz="quarter" idx="12"/>
+          </p:nvPr>
+        </p:nvSpPr>
+        <p:spPr/>
+        <p:txBody>
+          <a:bodyPr/>
+          <a:lstStyle/>
+          <a:p>
+            <a:fld id="{3F8E978B-2864-4D28-B1B3-2F4738476E14}" type="slidenum">
+              <a:rPr lang="en-US" smtClean="0"/>
+              <a:t>18</a:t>
+            </a:fld>
+            <a:endParaRPr lang="en-US"/>
+          </a:p>
+        </p:txBody>
+      </p:sp>
+    </p:spTree>
+    <p:extLst>
+      <p:ext uri="{BB962C8B-B14F-4D97-AF65-F5344CB8AC3E}">
+        <p14:creationId xmlns:p14="http://schemas.microsoft.com/office/powerpoint/2010/main" val="62069509"/>
+      </p:ext>
+    </p:extLst>
+  </p:cSld>
+  <p:clrMapOvr>
+    <a:masterClrMapping/>
+  </p:clrMapOvr>
+</p:sld>
+</file>
+
 <file path=ppt/slides/slide2.xml><?xml version="1.0" encoding="utf-8"?>
 <p:sld xmlns:a="http://schemas.openxmlformats.org/drawingml/2006/main" xmlns:r="http://schemas.openxmlformats.org/officeDocument/2006/relationships" xmlns:p="http://schemas.openxmlformats.org/presentationml/2006/main">
   <p:cSld>
@@ -6304,7 +6490,9 @@
         </p:nvSpPr>
         <p:spPr/>
         <p:txBody>
-          <a:bodyPr/>
+          <a:bodyPr>
+            <a:normAutofit fontScale="92500" lnSpcReduction="20000"/>
+          </a:bodyPr>
           <a:lstStyle/>
           <a:p>
             <a:r>
@@ -6361,6 +6549,21 @@
               <a:rPr lang="en-US" dirty="0"/>
               <a:t>Compare Building To Nearby/Similar Buildings</a:t>
             </a:r>
+          </a:p>
+          <a:p>
+            <a:r>
+              <a:rPr lang="en-US" dirty="0"/>
+              <a:t>Histogram Comparisons to Nearby Homes</a:t>
+            </a:r>
+          </a:p>
+          <a:p>
+            <a:r>
+              <a:rPr lang="en-US" dirty="0"/>
+              <a:t>Trend Projections</a:t>
+            </a:r>
+          </a:p>
+          <a:p>
+            <a:endParaRPr lang="en-US" dirty="0"/>
           </a:p>
         </p:txBody>
       </p:sp>

</xml_diff>